<commit_message>
more resources for privacy debate
</commit_message>
<xml_diff>
--- a/docs/slides/04-Systems.pptx
+++ b/docs/slides/04-Systems.pptx
@@ -6000,7 +6000,7 @@
             <a:fld id="{E1F349F5-8D7E-4776-AABD-2405072C492C}" type="datetimeFigureOut">
               <a:rPr lang="en-US" smtClean="0"/>
               <a:pPr/>
-              <a:t>1/24/22</a:t>
+              <a:t>1/18/23</a:t>
             </a:fld>
             <a:endParaRPr lang="en-US"/>
           </a:p>
@@ -10366,7 +10366,7 @@
                 </a:solidFill>
               </a:rPr>
               <a:pPr/>
-              <a:t>1/24/22</a:t>
+              <a:t>1/18/23</a:t>
             </a:fld>
             <a:endParaRPr lang="en-US">
               <a:solidFill>
@@ -10566,7 +10566,7 @@
                 </a:solidFill>
               </a:rPr>
               <a:pPr/>
-              <a:t>1/24/22</a:t>
+              <a:t>1/18/23</a:t>
             </a:fld>
             <a:endParaRPr lang="en-US">
               <a:solidFill>
@@ -10776,7 +10776,7 @@
                 </a:solidFill>
               </a:rPr>
               <a:pPr/>
-              <a:t>1/24/22</a:t>
+              <a:t>1/18/23</a:t>
             </a:fld>
             <a:endParaRPr lang="en-US">
               <a:solidFill>
@@ -10976,7 +10976,7 @@
                 </a:solidFill>
               </a:rPr>
               <a:pPr/>
-              <a:t>1/24/22</a:t>
+              <a:t>1/18/23</a:t>
             </a:fld>
             <a:endParaRPr lang="en-US">
               <a:solidFill>
@@ -11253,7 +11253,7 @@
                 </a:solidFill>
               </a:rPr>
               <a:pPr/>
-              <a:t>1/24/22</a:t>
+              <a:t>1/18/23</a:t>
             </a:fld>
             <a:endParaRPr lang="en-US">
               <a:solidFill>
@@ -11570,7 +11570,7 @@
                 </a:solidFill>
               </a:rPr>
               <a:pPr/>
-              <a:t>1/24/22</a:t>
+              <a:t>1/18/23</a:t>
             </a:fld>
             <a:endParaRPr lang="en-US">
               <a:solidFill>
@@ -12021,7 +12021,7 @@
                 </a:solidFill>
               </a:rPr>
               <a:pPr/>
-              <a:t>1/24/22</a:t>
+              <a:t>1/18/23</a:t>
             </a:fld>
             <a:endParaRPr lang="en-US">
               <a:solidFill>
@@ -12170,7 +12170,7 @@
                 </a:solidFill>
               </a:rPr>
               <a:pPr/>
-              <a:t>1/24/22</a:t>
+              <a:t>1/18/23</a:t>
             </a:fld>
             <a:endParaRPr lang="en-US">
               <a:solidFill>
@@ -12297,7 +12297,7 @@
                 </a:solidFill>
               </a:rPr>
               <a:pPr/>
-              <a:t>1/24/22</a:t>
+              <a:t>1/18/23</a:t>
             </a:fld>
             <a:endParaRPr lang="en-US">
               <a:solidFill>
@@ -12604,7 +12604,7 @@
                 </a:solidFill>
               </a:rPr>
               <a:pPr/>
-              <a:t>1/24/22</a:t>
+              <a:t>1/18/23</a:t>
             </a:fld>
             <a:endParaRPr lang="en-US">
               <a:solidFill>
@@ -12888,7 +12888,7 @@
                 </a:solidFill>
               </a:rPr>
               <a:pPr/>
-              <a:t>1/24/22</a:t>
+              <a:t>1/18/23</a:t>
             </a:fld>
             <a:endParaRPr lang="en-US">
               <a:solidFill>
@@ -13131,7 +13131,7 @@
                 </a:solidFill>
               </a:rPr>
               <a:pPr/>
-              <a:t>1/24/22</a:t>
+              <a:t>1/18/23</a:t>
             </a:fld>
             <a:endParaRPr lang="en-US">
               <a:solidFill>
@@ -14682,7 +14682,7 @@
           <a:noFill/>
           <a:extLst>
             <a:ext uri="{909E8E84-426E-40dd-AFC4-6F175D3DCCD1}">
-              <a14:hiddenFill xmlns:a14="http://schemas.microsoft.com/office/drawing/2010/main" xmlns="">
+              <a14:hiddenFill xmlns="" xmlns:a14="http://schemas.microsoft.com/office/drawing/2010/main">
                 <a:solidFill>
                   <a:srgbClr val="FFFFFF"/>
                 </a:solidFill>
@@ -14988,7 +14988,7 @@
           <a:noFill/>
           <a:extLst>
             <a:ext uri="{909E8E84-426E-40dd-AFC4-6F175D3DCCD1}">
-              <a14:hiddenFill xmlns:a14="http://schemas.microsoft.com/office/drawing/2010/main" xmlns="">
+              <a14:hiddenFill xmlns="" xmlns:a14="http://schemas.microsoft.com/office/drawing/2010/main">
                 <a:solidFill>
                   <a:srgbClr val="FFFFFF"/>
                 </a:solidFill>
@@ -16713,7 +16713,7 @@
           <a:noFill/>
           <a:extLst>
             <a:ext uri="{909E8E84-426E-40dd-AFC4-6F175D3DCCD1}">
-              <a14:hiddenFill xmlns:a14="http://schemas.microsoft.com/office/drawing/2010/main" xmlns="">
+              <a14:hiddenFill xmlns="" xmlns:a14="http://schemas.microsoft.com/office/drawing/2010/main">
                 <a:solidFill>
                   <a:srgbClr val="FFFFFF"/>
                 </a:solidFill>
@@ -17259,7 +17259,7 @@
           <a:noFill/>
           <a:extLst>
             <a:ext uri="{909E8E84-426E-40dd-AFC4-6F175D3DCCD1}">
-              <a14:hiddenFill xmlns:a14="http://schemas.microsoft.com/office/drawing/2010/main" xmlns="">
+              <a14:hiddenFill xmlns="" xmlns:a14="http://schemas.microsoft.com/office/drawing/2010/main">
                 <a:solidFill>
                   <a:srgbClr val="FFFFFF"/>
                 </a:solidFill>
@@ -17300,7 +17300,7 @@
           <a:noFill/>
           <a:extLst>
             <a:ext uri="{909E8E84-426E-40dd-AFC4-6F175D3DCCD1}">
-              <a14:hiddenFill xmlns:a14="http://schemas.microsoft.com/office/drawing/2010/main" xmlns="">
+              <a14:hiddenFill xmlns="" xmlns:a14="http://schemas.microsoft.com/office/drawing/2010/main">
                 <a:solidFill>
                   <a:srgbClr val="FFFFFF"/>
                 </a:solidFill>
@@ -17964,7 +17964,7 @@
           <a:noFill/>
           <a:extLst>
             <a:ext uri="{909E8E84-426E-40dd-AFC4-6F175D3DCCD1}">
-              <a14:hiddenFill xmlns:a14="http://schemas.microsoft.com/office/drawing/2010/main" xmlns="">
+              <a14:hiddenFill xmlns="" xmlns:a14="http://schemas.microsoft.com/office/drawing/2010/main">
                 <a:solidFill>
                   <a:srgbClr val="FFFFFF"/>
                 </a:solidFill>
@@ -23159,7 +23159,7 @@
           <a:noFill/>
           <a:extLst>
             <a:ext uri="{909E8E84-426E-40dd-AFC4-6F175D3DCCD1}">
-              <a14:hiddenFill xmlns:a14="http://schemas.microsoft.com/office/drawing/2010/main" xmlns="">
+              <a14:hiddenFill xmlns="" xmlns:a14="http://schemas.microsoft.com/office/drawing/2010/main">
                 <a:solidFill>
                   <a:srgbClr val="FFFFFF"/>
                 </a:solidFill>

</xml_diff>